<commit_message>
update puzzles per comments
</commit_message>
<xml_diff>
--- a/docs/Puzzles-Handouts.pptx
+++ b/docs/Puzzles-Handouts.pptx
@@ -197,7 +197,7 @@
           <a:p>
             <a:fld id="{97B65FCD-E5AE-CE4C-A396-F684D07D7D65}" type="datetimeFigureOut">
               <a:rPr lang="en-US" smtClean="0"/>
-              <a:t>7/2/17</a:t>
+              <a:t>7/30/17</a:t>
             </a:fld>
             <a:endParaRPr lang="en-US"/>
           </a:p>
@@ -814,7 +814,7 @@
           <a:p>
             <a:fld id="{9A40FE2E-E4F4-B744-B8C3-1FE0FC0A82C5}" type="datetimeFigureOut">
               <a:rPr lang="en-US" smtClean="0"/>
-              <a:t>7/2/17</a:t>
+              <a:t>7/30/17</a:t>
             </a:fld>
             <a:endParaRPr lang="en-US"/>
           </a:p>
@@ -984,7 +984,7 @@
           <a:p>
             <a:fld id="{9A40FE2E-E4F4-B744-B8C3-1FE0FC0A82C5}" type="datetimeFigureOut">
               <a:rPr lang="en-US" smtClean="0"/>
-              <a:t>7/2/17</a:t>
+              <a:t>7/30/17</a:t>
             </a:fld>
             <a:endParaRPr lang="en-US"/>
           </a:p>
@@ -1164,7 +1164,7 @@
           <a:p>
             <a:fld id="{9A40FE2E-E4F4-B744-B8C3-1FE0FC0A82C5}" type="datetimeFigureOut">
               <a:rPr lang="en-US" smtClean="0"/>
-              <a:t>7/2/17</a:t>
+              <a:t>7/30/17</a:t>
             </a:fld>
             <a:endParaRPr lang="en-US"/>
           </a:p>
@@ -1334,7 +1334,7 @@
           <a:p>
             <a:fld id="{9A40FE2E-E4F4-B744-B8C3-1FE0FC0A82C5}" type="datetimeFigureOut">
               <a:rPr lang="en-US" smtClean="0"/>
-              <a:t>7/2/17</a:t>
+              <a:t>7/30/17</a:t>
             </a:fld>
             <a:endParaRPr lang="en-US"/>
           </a:p>
@@ -1580,7 +1580,7 @@
           <a:p>
             <a:fld id="{9A40FE2E-E4F4-B744-B8C3-1FE0FC0A82C5}" type="datetimeFigureOut">
               <a:rPr lang="en-US" smtClean="0"/>
-              <a:t>7/2/17</a:t>
+              <a:t>7/30/17</a:t>
             </a:fld>
             <a:endParaRPr lang="en-US"/>
           </a:p>
@@ -1868,7 +1868,7 @@
           <a:p>
             <a:fld id="{9A40FE2E-E4F4-B744-B8C3-1FE0FC0A82C5}" type="datetimeFigureOut">
               <a:rPr lang="en-US" smtClean="0"/>
-              <a:t>7/2/17</a:t>
+              <a:t>7/30/17</a:t>
             </a:fld>
             <a:endParaRPr lang="en-US"/>
           </a:p>
@@ -2290,7 +2290,7 @@
           <a:p>
             <a:fld id="{9A40FE2E-E4F4-B744-B8C3-1FE0FC0A82C5}" type="datetimeFigureOut">
               <a:rPr lang="en-US" smtClean="0"/>
-              <a:t>7/2/17</a:t>
+              <a:t>7/30/17</a:t>
             </a:fld>
             <a:endParaRPr lang="en-US"/>
           </a:p>
@@ -2408,7 +2408,7 @@
           <a:p>
             <a:fld id="{9A40FE2E-E4F4-B744-B8C3-1FE0FC0A82C5}" type="datetimeFigureOut">
               <a:rPr lang="en-US" smtClean="0"/>
-              <a:t>7/2/17</a:t>
+              <a:t>7/30/17</a:t>
             </a:fld>
             <a:endParaRPr lang="en-US"/>
           </a:p>
@@ -2503,7 +2503,7 @@
           <a:p>
             <a:fld id="{9A40FE2E-E4F4-B744-B8C3-1FE0FC0A82C5}" type="datetimeFigureOut">
               <a:rPr lang="en-US" smtClean="0"/>
-              <a:t>7/2/17</a:t>
+              <a:t>7/30/17</a:t>
             </a:fld>
             <a:endParaRPr lang="en-US"/>
           </a:p>
@@ -2780,7 +2780,7 @@
           <a:p>
             <a:fld id="{9A40FE2E-E4F4-B744-B8C3-1FE0FC0A82C5}" type="datetimeFigureOut">
               <a:rPr lang="en-US" smtClean="0"/>
-              <a:t>7/2/17</a:t>
+              <a:t>7/30/17</a:t>
             </a:fld>
             <a:endParaRPr lang="en-US"/>
           </a:p>
@@ -3033,7 +3033,7 @@
           <a:p>
             <a:fld id="{9A40FE2E-E4F4-B744-B8C3-1FE0FC0A82C5}" type="datetimeFigureOut">
               <a:rPr lang="en-US" smtClean="0"/>
-              <a:t>7/2/17</a:t>
+              <a:t>7/30/17</a:t>
             </a:fld>
             <a:endParaRPr lang="en-US"/>
           </a:p>
@@ -3246,7 +3246,7 @@
           <a:p>
             <a:fld id="{9A40FE2E-E4F4-B744-B8C3-1FE0FC0A82C5}" type="datetimeFigureOut">
               <a:rPr lang="en-US" smtClean="0"/>
-              <a:t>7/2/17</a:t>
+              <a:t>7/30/17</a:t>
             </a:fld>
             <a:endParaRPr lang="en-US"/>
           </a:p>
@@ -5824,7 +5824,6 @@
               <a:rPr lang="en-US" dirty="0"/>
               <a:t>)</a:t>
             </a:r>
-            <a:endParaRPr lang="en-US" dirty="0"/>
           </a:p>
         </p:txBody>
       </p:sp>
@@ -5865,7 +5864,6 @@
               <a:rPr lang="en-US" dirty="0"/>
               <a:t>)</a:t>
             </a:r>
-            <a:endParaRPr lang="en-US" dirty="0"/>
           </a:p>
         </p:txBody>
       </p:sp>
@@ -6141,7 +6139,7 @@
         </p:nvSpPr>
         <p:spPr>
           <a:xfrm>
-            <a:off x="573527" y="450600"/>
+            <a:off x="573527" y="0"/>
             <a:ext cx="6226864" cy="1292662"/>
           </a:xfrm>
           <a:prstGeom prst="rect">
@@ -6865,6 +6863,72 @@
           <a:p>
             <a:pPr algn="ctr"/>
             <a:endParaRPr lang="en-US"/>
+          </a:p>
+        </p:txBody>
+      </p:sp>
+      <p:sp>
+        <p:nvSpPr>
+          <p:cNvPr id="2" name="Rectangle 1"/>
+          <p:cNvSpPr/>
+          <p:nvPr/>
+        </p:nvSpPr>
+        <p:spPr>
+          <a:xfrm>
+            <a:off x="573527" y="1292662"/>
+            <a:ext cx="4572000" cy="646331"/>
+          </a:xfrm>
+          <a:prstGeom prst="rect">
+            <a:avLst/>
+          </a:prstGeom>
+        </p:spPr>
+        <p:txBody>
+          <a:bodyPr>
+            <a:spAutoFit/>
+          </a:bodyPr>
+          <a:lstStyle/>
+          <a:p>
+            <a:r>
+              <a:rPr lang="en-US" b="1" dirty="0" err="1">
+                <a:solidFill>
+                  <a:srgbClr val="000000"/>
+                </a:solidFill>
+              </a:rPr>
+              <a:t>UnaryOperator</a:t>
+            </a:r>
+            <a:r>
+              <a:rPr lang="en-US" b="1" dirty="0">
+                <a:solidFill>
+                  <a:srgbClr val="000000"/>
+                </a:solidFill>
+              </a:rPr>
+              <a:t>&lt;Integer&gt; op = x -&gt; x + 1;</a:t>
+            </a:r>
+          </a:p>
+          <a:p>
+            <a:r>
+              <a:rPr lang="en-US" b="1" dirty="0">
+                <a:solidFill>
+                  <a:srgbClr val="000000"/>
+                </a:solidFill>
+              </a:rPr>
+              <a:t>Predicate&lt;Integer&gt; </a:t>
+            </a:r>
+            <a:r>
+              <a:rPr lang="en-US" b="1" dirty="0" err="1">
+                <a:solidFill>
+                  <a:srgbClr val="000000"/>
+                </a:solidFill>
+              </a:rPr>
+              <a:t>pred</a:t>
+            </a:r>
+            <a:r>
+              <a:rPr lang="en-US" b="1" dirty="0">
+                <a:solidFill>
+                  <a:srgbClr val="000000"/>
+                </a:solidFill>
+              </a:rPr>
+              <a:t> = x -&gt; x &gt; 5;</a:t>
+            </a:r>
           </a:p>
         </p:txBody>
       </p:sp>
@@ -7401,7 +7465,7 @@
         <p:spPr>
           <a:xfrm>
             <a:off x="3639252" y="3761819"/>
-            <a:ext cx="1369035" cy="646331"/>
+            <a:ext cx="719593" cy="369332"/>
           </a:xfrm>
           <a:prstGeom prst="rect">
             <a:avLst/>
@@ -7414,30 +7478,20 @@
           <a:lstStyle/>
           <a:p>
             <a:r>
-              <a:rPr lang="it-IT" dirty="0" err="1"/>
-              <a:t>max</a:t>
+              <a:rPr lang="it-IT"/>
+              <a:t>m</a:t>
+            </a:r>
+            <a:r>
+              <a:rPr lang="it-IT" smtClean="0"/>
+              <a:t>ax</a:t>
+            </a:r>
+            <a:r>
+              <a:rPr lang="it-IT" dirty="0" smtClean="0"/>
+              <a:t>(</a:t>
             </a:r>
             <a:r>
               <a:rPr lang="it-IT" dirty="0"/>
-              <a:t>((a, b) -</a:t>
-            </a:r>
-            <a:r>
-              <a:rPr lang="it-IT" dirty="0" smtClean="0"/>
-              <a:t>&gt;</a:t>
-            </a:r>
-          </a:p>
-          <a:p>
-            <a:r>
-              <a:rPr lang="it-IT" dirty="0"/>
-              <a:t> </a:t>
-            </a:r>
-            <a:r>
-              <a:rPr lang="it-IT" dirty="0" smtClean="0"/>
-              <a:t> </a:t>
-            </a:r>
-            <a:r>
-              <a:rPr lang="it-IT" dirty="0"/>
-              <a:t>a -b)</a:t>
+              <a:t>)</a:t>
             </a:r>
             <a:endParaRPr lang="en-US" dirty="0"/>
           </a:p>

</xml_diff>

<commit_message>
fixed typo in puzzle 3; thanks cathy!
</commit_message>
<xml_diff>
--- a/docs/Puzzles-Handouts.pptx
+++ b/docs/Puzzles-Handouts.pptx
@@ -197,7 +197,7 @@
           <a:p>
             <a:fld id="{97B65FCD-E5AE-CE4C-A396-F684D07D7D65}" type="datetimeFigureOut">
               <a:rPr lang="en-US" smtClean="0"/>
-              <a:t>7/30/17</a:t>
+              <a:t>5/25/18</a:t>
             </a:fld>
             <a:endParaRPr lang="en-US"/>
           </a:p>
@@ -814,7 +814,7 @@
           <a:p>
             <a:fld id="{9A40FE2E-E4F4-B744-B8C3-1FE0FC0A82C5}" type="datetimeFigureOut">
               <a:rPr lang="en-US" smtClean="0"/>
-              <a:t>7/30/17</a:t>
+              <a:t>5/25/18</a:t>
             </a:fld>
             <a:endParaRPr lang="en-US"/>
           </a:p>
@@ -984,7 +984,7 @@
           <a:p>
             <a:fld id="{9A40FE2E-E4F4-B744-B8C3-1FE0FC0A82C5}" type="datetimeFigureOut">
               <a:rPr lang="en-US" smtClean="0"/>
-              <a:t>7/30/17</a:t>
+              <a:t>5/25/18</a:t>
             </a:fld>
             <a:endParaRPr lang="en-US"/>
           </a:p>
@@ -1164,7 +1164,7 @@
           <a:p>
             <a:fld id="{9A40FE2E-E4F4-B744-B8C3-1FE0FC0A82C5}" type="datetimeFigureOut">
               <a:rPr lang="en-US" smtClean="0"/>
-              <a:t>7/30/17</a:t>
+              <a:t>5/25/18</a:t>
             </a:fld>
             <a:endParaRPr lang="en-US"/>
           </a:p>
@@ -1334,7 +1334,7 @@
           <a:p>
             <a:fld id="{9A40FE2E-E4F4-B744-B8C3-1FE0FC0A82C5}" type="datetimeFigureOut">
               <a:rPr lang="en-US" smtClean="0"/>
-              <a:t>7/30/17</a:t>
+              <a:t>5/25/18</a:t>
             </a:fld>
             <a:endParaRPr lang="en-US"/>
           </a:p>
@@ -1580,7 +1580,7 @@
           <a:p>
             <a:fld id="{9A40FE2E-E4F4-B744-B8C3-1FE0FC0A82C5}" type="datetimeFigureOut">
               <a:rPr lang="en-US" smtClean="0"/>
-              <a:t>7/30/17</a:t>
+              <a:t>5/25/18</a:t>
             </a:fld>
             <a:endParaRPr lang="en-US"/>
           </a:p>
@@ -1868,7 +1868,7 @@
           <a:p>
             <a:fld id="{9A40FE2E-E4F4-B744-B8C3-1FE0FC0A82C5}" type="datetimeFigureOut">
               <a:rPr lang="en-US" smtClean="0"/>
-              <a:t>7/30/17</a:t>
+              <a:t>5/25/18</a:t>
             </a:fld>
             <a:endParaRPr lang="en-US"/>
           </a:p>
@@ -2290,7 +2290,7 @@
           <a:p>
             <a:fld id="{9A40FE2E-E4F4-B744-B8C3-1FE0FC0A82C5}" type="datetimeFigureOut">
               <a:rPr lang="en-US" smtClean="0"/>
-              <a:t>7/30/17</a:t>
+              <a:t>5/25/18</a:t>
             </a:fld>
             <a:endParaRPr lang="en-US"/>
           </a:p>
@@ -2408,7 +2408,7 @@
           <a:p>
             <a:fld id="{9A40FE2E-E4F4-B744-B8C3-1FE0FC0A82C5}" type="datetimeFigureOut">
               <a:rPr lang="en-US" smtClean="0"/>
-              <a:t>7/30/17</a:t>
+              <a:t>5/25/18</a:t>
             </a:fld>
             <a:endParaRPr lang="en-US"/>
           </a:p>
@@ -2503,7 +2503,7 @@
           <a:p>
             <a:fld id="{9A40FE2E-E4F4-B744-B8C3-1FE0FC0A82C5}" type="datetimeFigureOut">
               <a:rPr lang="en-US" smtClean="0"/>
-              <a:t>7/30/17</a:t>
+              <a:t>5/25/18</a:t>
             </a:fld>
             <a:endParaRPr lang="en-US"/>
           </a:p>
@@ -2780,7 +2780,7 @@
           <a:p>
             <a:fld id="{9A40FE2E-E4F4-B744-B8C3-1FE0FC0A82C5}" type="datetimeFigureOut">
               <a:rPr lang="en-US" smtClean="0"/>
-              <a:t>7/30/17</a:t>
+              <a:t>5/25/18</a:t>
             </a:fld>
             <a:endParaRPr lang="en-US"/>
           </a:p>
@@ -3033,7 +3033,7 @@
           <a:p>
             <a:fld id="{9A40FE2E-E4F4-B744-B8C3-1FE0FC0A82C5}" type="datetimeFigureOut">
               <a:rPr lang="en-US" smtClean="0"/>
-              <a:t>7/30/17</a:t>
+              <a:t>5/25/18</a:t>
             </a:fld>
             <a:endParaRPr lang="en-US"/>
           </a:p>
@@ -3246,7 +3246,7 @@
           <a:p>
             <a:fld id="{9A40FE2E-E4F4-B744-B8C3-1FE0FC0A82C5}" type="datetimeFigureOut">
               <a:rPr lang="en-US" smtClean="0"/>
-              <a:t>7/30/17</a:t>
+              <a:t>5/25/18</a:t>
             </a:fld>
             <a:endParaRPr lang="en-US"/>
           </a:p>
@@ -6178,7 +6178,7 @@
             </a:r>
             <a:r>
               <a:rPr lang="en-US" b="1" smtClean="0"/>
-              <a:t>2 </a:t>
+              <a:t>6 </a:t>
             </a:r>
             <a:r>
               <a:rPr lang="en-US" b="1" dirty="0" smtClean="0"/>

</xml_diff>